<commit_message>
working fit_GN_all_Ei800.m with Kun caclulations and single (best) 110 cut
</commit_message>
<xml_diff>
--- a/2018April/Working2018_landscape.pptx
+++ b/2018April/Working2018_landscape.pptx
@@ -293,7 +293,7 @@
           <a:p>
             <a:fld id="{639E62D1-4640-4083-8F5C-B13D0FD3538F}" type="datetimeFigureOut">
               <a:rPr lang="en-GB" smtClean="0"/>
-              <a:t>13/07/2018</a:t>
+              <a:t>03/12/2018</a:t>
             </a:fld>
             <a:endParaRPr lang="en-GB"/>
           </a:p>
@@ -463,7 +463,7 @@
           <a:p>
             <a:fld id="{639E62D1-4640-4083-8F5C-B13D0FD3538F}" type="datetimeFigureOut">
               <a:rPr lang="en-GB" smtClean="0"/>
-              <a:t>13/07/2018</a:t>
+              <a:t>03/12/2018</a:t>
             </a:fld>
             <a:endParaRPr lang="en-GB"/>
           </a:p>
@@ -643,7 +643,7 @@
           <a:p>
             <a:fld id="{639E62D1-4640-4083-8F5C-B13D0FD3538F}" type="datetimeFigureOut">
               <a:rPr lang="en-GB" smtClean="0"/>
-              <a:t>13/07/2018</a:t>
+              <a:t>03/12/2018</a:t>
             </a:fld>
             <a:endParaRPr lang="en-GB"/>
           </a:p>
@@ -813,7 +813,7 @@
           <a:p>
             <a:fld id="{639E62D1-4640-4083-8F5C-B13D0FD3538F}" type="datetimeFigureOut">
               <a:rPr lang="en-GB" smtClean="0"/>
-              <a:t>13/07/2018</a:t>
+              <a:t>03/12/2018</a:t>
             </a:fld>
             <a:endParaRPr lang="en-GB"/>
           </a:p>
@@ -1059,7 +1059,7 @@
           <a:p>
             <a:fld id="{639E62D1-4640-4083-8F5C-B13D0FD3538F}" type="datetimeFigureOut">
               <a:rPr lang="en-GB" smtClean="0"/>
-              <a:t>13/07/2018</a:t>
+              <a:t>03/12/2018</a:t>
             </a:fld>
             <a:endParaRPr lang="en-GB"/>
           </a:p>
@@ -1347,7 +1347,7 @@
           <a:p>
             <a:fld id="{639E62D1-4640-4083-8F5C-B13D0FD3538F}" type="datetimeFigureOut">
               <a:rPr lang="en-GB" smtClean="0"/>
-              <a:t>13/07/2018</a:t>
+              <a:t>03/12/2018</a:t>
             </a:fld>
             <a:endParaRPr lang="en-GB"/>
           </a:p>
@@ -1769,7 +1769,7 @@
           <a:p>
             <a:fld id="{639E62D1-4640-4083-8F5C-B13D0FD3538F}" type="datetimeFigureOut">
               <a:rPr lang="en-GB" smtClean="0"/>
-              <a:t>13/07/2018</a:t>
+              <a:t>03/12/2018</a:t>
             </a:fld>
             <a:endParaRPr lang="en-GB"/>
           </a:p>
@@ -1887,7 +1887,7 @@
           <a:p>
             <a:fld id="{639E62D1-4640-4083-8F5C-B13D0FD3538F}" type="datetimeFigureOut">
               <a:rPr lang="en-GB" smtClean="0"/>
-              <a:t>13/07/2018</a:t>
+              <a:t>03/12/2018</a:t>
             </a:fld>
             <a:endParaRPr lang="en-GB"/>
           </a:p>
@@ -1982,7 +1982,7 @@
           <a:p>
             <a:fld id="{639E62D1-4640-4083-8F5C-B13D0FD3538F}" type="datetimeFigureOut">
               <a:rPr lang="en-GB" smtClean="0"/>
-              <a:t>13/07/2018</a:t>
+              <a:t>03/12/2018</a:t>
             </a:fld>
             <a:endParaRPr lang="en-GB"/>
           </a:p>
@@ -2259,7 +2259,7 @@
           <a:p>
             <a:fld id="{639E62D1-4640-4083-8F5C-B13D0FD3538F}" type="datetimeFigureOut">
               <a:rPr lang="en-GB" smtClean="0"/>
-              <a:t>13/07/2018</a:t>
+              <a:t>03/12/2018</a:t>
             </a:fld>
             <a:endParaRPr lang="en-GB"/>
           </a:p>
@@ -2512,7 +2512,7 @@
           <a:p>
             <a:fld id="{639E62D1-4640-4083-8F5C-B13D0FD3538F}" type="datetimeFigureOut">
               <a:rPr lang="en-GB" smtClean="0"/>
-              <a:t>13/07/2018</a:t>
+              <a:t>03/12/2018</a:t>
             </a:fld>
             <a:endParaRPr lang="en-GB"/>
           </a:p>
@@ -2725,7 +2725,7 @@
           <a:p>
             <a:fld id="{639E62D1-4640-4083-8F5C-B13D0FD3538F}" type="datetimeFigureOut">
               <a:rPr lang="en-GB" smtClean="0"/>
-              <a:t>13/07/2018</a:t>
+              <a:t>03/12/2018</a:t>
             </a:fld>
             <a:endParaRPr lang="en-GB"/>
           </a:p>

</xml_diff>